<commit_message>
organised the frontpage in 3 subsuites
</commit_message>
<xml_diff>
--- a/Slides/20090514_iLearn_AgileAcceptanceTesting.pptx
+++ b/Slides/20090514_iLearn_AgileAcceptanceTesting.pptx
@@ -212,7 +212,7 @@
             <a:fld id="{08F0785E-033A-43CD-AF7D-1A09C6890A39}" type="datetimeFigureOut">
               <a:rPr lang="nl-BE" smtClean="0"/>
               <a:pPr/>
-              <a:t>07/04/2009</a:t>
+              <a:t>22/04/2009</a:t>
             </a:fld>
             <a:endParaRPr lang="nl-BE"/>
           </a:p>
@@ -2300,7 +2300,7 @@
             <a:fld id="{FB938823-3E05-40BA-BF51-A1BB5DC0A85F}" type="datetimeFigureOut">
               <a:rPr lang="nl-BE" smtClean="0"/>
               <a:pPr/>
-              <a:t>07/04/2009</a:t>
+              <a:t>22/04/2009</a:t>
             </a:fld>
             <a:endParaRPr lang="nl-BE"/>
           </a:p>
@@ -2498,7 +2498,7 @@
             <a:fld id="{FB938823-3E05-40BA-BF51-A1BB5DC0A85F}" type="datetimeFigureOut">
               <a:rPr lang="nl-BE" smtClean="0"/>
               <a:pPr/>
-              <a:t>07/04/2009</a:t>
+              <a:t>22/04/2009</a:t>
             </a:fld>
             <a:endParaRPr lang="nl-BE"/>
           </a:p>
@@ -2685,7 +2685,7 @@
             <a:fld id="{FB938823-3E05-40BA-BF51-A1BB5DC0A85F}" type="datetimeFigureOut">
               <a:rPr lang="nl-BE" smtClean="0"/>
               <a:pPr/>
-              <a:t>07/04/2009</a:t>
+              <a:t>22/04/2009</a:t>
             </a:fld>
             <a:endParaRPr lang="nl-BE"/>
           </a:p>
@@ -2837,7 +2837,7 @@
             <a:fld id="{FB938823-3E05-40BA-BF51-A1BB5DC0A85F}" type="datetimeFigureOut">
               <a:rPr lang="nl-BE" smtClean="0"/>
               <a:pPr/>
-              <a:t>07/04/2009</a:t>
+              <a:t>22/04/2009</a:t>
             </a:fld>
             <a:endParaRPr lang="nl-BE"/>
           </a:p>
@@ -3094,7 +3094,7 @@
             <a:fld id="{FB938823-3E05-40BA-BF51-A1BB5DC0A85F}" type="datetimeFigureOut">
               <a:rPr lang="nl-BE" smtClean="0"/>
               <a:pPr/>
-              <a:t>07/04/2009</a:t>
+              <a:t>22/04/2009</a:t>
             </a:fld>
             <a:endParaRPr lang="nl-BE"/>
           </a:p>
@@ -3505,7 +3505,7 @@
             <a:fld id="{FB938823-3E05-40BA-BF51-A1BB5DC0A85F}" type="datetimeFigureOut">
               <a:rPr lang="nl-BE" smtClean="0"/>
               <a:pPr/>
-              <a:t>07/04/2009</a:t>
+              <a:t>22/04/2009</a:t>
             </a:fld>
             <a:endParaRPr lang="nl-BE"/>
           </a:p>
@@ -3953,7 +3953,7 @@
             <a:fld id="{FB938823-3E05-40BA-BF51-A1BB5DC0A85F}" type="datetimeFigureOut">
               <a:rPr lang="nl-BE" smtClean="0"/>
               <a:pPr/>
-              <a:t>07/04/2009</a:t>
+              <a:t>22/04/2009</a:t>
             </a:fld>
             <a:endParaRPr lang="nl-BE"/>
           </a:p>
@@ -4056,7 +4056,7 @@
             <a:fld id="{FB938823-3E05-40BA-BF51-A1BB5DC0A85F}" type="datetimeFigureOut">
               <a:rPr lang="nl-BE" smtClean="0"/>
               <a:pPr/>
-              <a:t>07/04/2009</a:t>
+              <a:t>22/04/2009</a:t>
             </a:fld>
             <a:endParaRPr lang="nl-BE"/>
           </a:p>
@@ -4179,7 +4179,7 @@
             <a:fld id="{FB938823-3E05-40BA-BF51-A1BB5DC0A85F}" type="datetimeFigureOut">
               <a:rPr lang="nl-BE" smtClean="0"/>
               <a:pPr/>
-              <a:t>07/04/2009</a:t>
+              <a:t>22/04/2009</a:t>
             </a:fld>
             <a:endParaRPr lang="nl-BE"/>
           </a:p>
@@ -4455,7 +4455,7 @@
             <a:fld id="{FB938823-3E05-40BA-BF51-A1BB5DC0A85F}" type="datetimeFigureOut">
               <a:rPr lang="nl-BE" smtClean="0"/>
               <a:pPr/>
-              <a:t>07/04/2009</a:t>
+              <a:t>22/04/2009</a:t>
             </a:fld>
             <a:endParaRPr lang="nl-BE"/>
           </a:p>
@@ -4662,7 +4662,7 @@
             <a:fld id="{FB938823-3E05-40BA-BF51-A1BB5DC0A85F}" type="datetimeFigureOut">
               <a:rPr lang="nl-BE" smtClean="0"/>
               <a:pPr/>
-              <a:t>07/04/2009</a:t>
+              <a:t>22/04/2009</a:t>
             </a:fld>
             <a:endParaRPr lang="nl-BE"/>
           </a:p>
@@ -5773,7 +5773,7 @@
             <a:fld id="{FB938823-3E05-40BA-BF51-A1BB5DC0A85F}" type="datetimeFigureOut">
               <a:rPr lang="nl-BE" smtClean="0"/>
               <a:pPr/>
-              <a:t>07/04/2009</a:t>
+              <a:t>22/04/2009</a:t>
             </a:fld>
             <a:endParaRPr lang="nl-BE"/>
           </a:p>
@@ -6345,11 +6345,7 @@
             <a:pPr marL="880110" lvl="1" indent="-514350"/>
             <a:r>
               <a:rPr lang="nl-BE" b="1" dirty="0" smtClean="0"/>
-              <a:t>Introduce and compile the demo </a:t>
-            </a:r>
-            <a:r>
-              <a:rPr lang="nl-BE" b="1" dirty="0" smtClean="0"/>
-              <a:t>application</a:t>
+              <a:t>Introduce and compile the demo application</a:t>
             </a:r>
             <a:endParaRPr lang="nl-BE" b="1" i="1" dirty="0" smtClean="0"/>
           </a:p>
@@ -6374,7 +6370,6 @@
               <a:rPr lang="nl-BE" i="1" dirty="0" smtClean="0"/>
               <a:t>Continuous Integration</a:t>
             </a:r>
-            <a:endParaRPr lang="nl-BE" i="1" dirty="0" smtClean="0"/>
           </a:p>
           <a:p>
             <a:pPr marL="624078" indent="-514350"/>
@@ -6401,11 +6396,7 @@
           <a:p>
             <a:r>
               <a:rPr lang="nl-BE" sz="3600" dirty="0" smtClean="0"/>
-              <a:t>Agile </a:t>
-            </a:r>
-            <a:r>
-              <a:rPr lang="nl-BE" sz="3600" dirty="0" smtClean="0"/>
-              <a:t>Acceptance Testing with Fitnesse</a:t>
+              <a:t>Agile Acceptance Testing with Fitnesse</a:t>
             </a:r>
             <a:endParaRPr lang="nl-BE" sz="3600" dirty="0"/>
           </a:p>
@@ -6524,7 +6515,6 @@
               <a:rPr lang="nl-BE" i="1" dirty="0" smtClean="0"/>
               <a:t>Continuous Integration</a:t>
             </a:r>
-            <a:endParaRPr lang="nl-BE" i="1" dirty="0" smtClean="0"/>
           </a:p>
           <a:p>
             <a:pPr marL="624078" indent="-514350"/>
@@ -6551,11 +6541,7 @@
           <a:p>
             <a:r>
               <a:rPr lang="nl-BE" sz="3600" dirty="0" smtClean="0"/>
-              <a:t>Agile </a:t>
-            </a:r>
-            <a:r>
-              <a:rPr lang="nl-BE" sz="3600" dirty="0" smtClean="0"/>
-              <a:t>Acceptance Testing with Fitnesse</a:t>
+              <a:t>Agile Acceptance Testing with Fitnesse</a:t>
             </a:r>
             <a:endParaRPr lang="nl-BE" sz="3600" dirty="0"/>
           </a:p>
@@ -6618,11 +6604,6 @@
               </a:rPr>
               <a:t>Mike Cohn’s testing piramid</a:t>
             </a:r>
-            <a:endParaRPr lang="nl-BE" dirty="0" smtClean="0">
-              <a:solidFill>
-                <a:srgbClr val="FF0000"/>
-              </a:solidFill>
-            </a:endParaRPr>
           </a:p>
           <a:p>
             <a:pPr lvl="1"/>
@@ -6710,11 +6691,6 @@
               </a:rPr>
               <a:t>Write gluecode for prepared tests</a:t>
             </a:r>
-            <a:endParaRPr lang="nl-BE" dirty="0" smtClean="0">
-              <a:solidFill>
-                <a:srgbClr val="FF0000"/>
-              </a:solidFill>
-            </a:endParaRPr>
           </a:p>
           <a:p>
             <a:endParaRPr lang="nl-BE" dirty="0" smtClean="0">
@@ -6857,11 +6833,16 @@
           <a:p>
             <a:r>
               <a:rPr lang="en-US" dirty="0" smtClean="0"/>
-              <a:t>Developers will actually read the </a:t>
-            </a:r>
+              <a:t>Developers will actually read the specifications</a:t>
+            </a:r>
+          </a:p>
+          <a:p>
+            <a:endParaRPr lang="en-US" dirty="0" smtClean="0"/>
+          </a:p>
+          <a:p>
             <a:r>
               <a:rPr lang="en-US" dirty="0" smtClean="0"/>
-              <a:t>specifications</a:t>
+              <a:t>They will understood the stuff correctly</a:t>
             </a:r>
           </a:p>
           <a:p>
@@ -6870,11 +6851,16 @@
           <a:p>
             <a:r>
               <a:rPr lang="en-US" dirty="0" smtClean="0"/>
-              <a:t>They </a:t>
-            </a:r>
+              <a:t>They will not skip parts of the spec</a:t>
+            </a:r>
+          </a:p>
+          <a:p>
+            <a:endParaRPr lang="en-US" dirty="0" smtClean="0"/>
+          </a:p>
+          <a:p>
             <a:r>
               <a:rPr lang="en-US" dirty="0" smtClean="0"/>
-              <a:t>will understood the stuff correctly</a:t>
+              <a:t>You can track the development progress</a:t>
             </a:r>
           </a:p>
           <a:p>
@@ -6883,45 +6869,7 @@
           <a:p>
             <a:r>
               <a:rPr lang="en-US" dirty="0" smtClean="0"/>
-              <a:t>They will not </a:t>
-            </a:r>
-            <a:r>
-              <a:rPr lang="en-US" dirty="0" smtClean="0"/>
-              <a:t>skip parts of the </a:t>
-            </a:r>
-            <a:r>
-              <a:rPr lang="en-US" dirty="0" smtClean="0"/>
-              <a:t>spec</a:t>
-            </a:r>
-          </a:p>
-          <a:p>
-            <a:endParaRPr lang="en-US" dirty="0" smtClean="0"/>
-          </a:p>
-          <a:p>
-            <a:r>
-              <a:rPr lang="en-US" dirty="0" smtClean="0"/>
-              <a:t>You </a:t>
-            </a:r>
-            <a:r>
-              <a:rPr lang="en-US" dirty="0" smtClean="0"/>
-              <a:t>can track the development </a:t>
-            </a:r>
-            <a:r>
-              <a:rPr lang="en-US" dirty="0" smtClean="0"/>
-              <a:t>progress</a:t>
-            </a:r>
-          </a:p>
-          <a:p>
-            <a:endParaRPr lang="en-US" dirty="0" smtClean="0"/>
-          </a:p>
-          <a:p>
-            <a:r>
-              <a:rPr lang="en-US" dirty="0" smtClean="0"/>
-              <a:t>Save </a:t>
-            </a:r>
-            <a:r>
-              <a:rPr lang="en-US" dirty="0" smtClean="0"/>
-              <a:t>time on acceptance/smoke testing</a:t>
+              <a:t>Save time on acceptance/smoke testing</a:t>
             </a:r>
           </a:p>
           <a:p>
@@ -7055,13 +7003,8 @@
           <a:p>
             <a:r>
               <a:rPr lang="en-GB" dirty="0" smtClean="0"/>
-              <a:t>It will be easier to take-over and hand-over </a:t>
-            </a:r>
-            <a:r>
-              <a:rPr lang="en-GB" dirty="0" smtClean="0"/>
-              <a:t>code</a:t>
-            </a:r>
-            <a:endParaRPr lang="en-GB" dirty="0" smtClean="0"/>
+              <a:t>It will be easier to take-over and hand-over code</a:t>
+            </a:r>
           </a:p>
         </p:txBody>
       </p:sp>
@@ -7188,11 +7131,7 @@
           <a:p>
             <a:r>
               <a:rPr lang="en-GB" dirty="0" smtClean="0"/>
-              <a:t>Verify </a:t>
-            </a:r>
-            <a:r>
-              <a:rPr lang="en-GB" dirty="0" smtClean="0"/>
-              <a:t>business rules by a click on a button</a:t>
+              <a:t>Verify business rules by a click on a button</a:t>
             </a:r>
           </a:p>
         </p:txBody>
@@ -7329,7 +7268,6 @@
               <a:rPr lang="nl-BE" b="1" i="1" dirty="0" smtClean="0"/>
               <a:t>Continuous Integration </a:t>
             </a:r>
-            <a:endParaRPr lang="nl-BE" b="1" i="1" dirty="0" smtClean="0"/>
           </a:p>
           <a:p>
             <a:pPr marL="624078" indent="-514350"/>
@@ -7439,11 +7377,7 @@
           <a:p>
             <a:r>
               <a:rPr lang="nl-BE" dirty="0" smtClean="0"/>
-              <a:t>2 Suites in </a:t>
-            </a:r>
-            <a:r>
-              <a:rPr lang="nl-BE" dirty="0" smtClean="0"/>
-              <a:t>Fitnesse</a:t>
+              <a:t>2 Suites in Fitnesse</a:t>
             </a:r>
           </a:p>
           <a:p>
@@ -7460,13 +7394,8 @@
             <a:pPr lvl="1"/>
             <a:r>
               <a:rPr lang="nl-BE" dirty="0" smtClean="0"/>
-              <a:t>Acceptance Suite – breaks the build</a:t>
-            </a:r>
-            <a:r>
-              <a:rPr lang="nl-BE" dirty="0" smtClean="0"/>
-              <a:t>!</a:t>
-            </a:r>
-            <a:endParaRPr lang="nl-BE" dirty="0" smtClean="0"/>
+              <a:t>Acceptance Suite – breaks the build!</a:t>
+            </a:r>
           </a:p>
         </p:txBody>
       </p:sp>
@@ -7573,11 +7502,7 @@
           <a:p>
             <a:r>
               <a:rPr lang="nl-BE" dirty="0" smtClean="0"/>
-              <a:t>On </a:t>
-            </a:r>
-            <a:r>
-              <a:rPr lang="nl-BE" dirty="0" smtClean="0"/>
-              <a:t>the web</a:t>
+              <a:t>On the web</a:t>
             </a:r>
           </a:p>
           <a:p>
@@ -7592,7 +7517,6 @@
               <a:rPr lang="nl-BE" dirty="0" smtClean="0"/>
               <a:t> </a:t>
             </a:r>
-            <a:endParaRPr lang="nl-BE" dirty="0" smtClean="0"/>
           </a:p>
           <a:p>
             <a:pPr lvl="1"/>
@@ -7600,13 +7524,7 @@
               <a:rPr lang="en-US" sz="2400" dirty="0" smtClean="0">
                 <a:hlinkClick r:id="rId3"/>
               </a:rPr>
-              <a:t>http://</a:t>
-            </a:r>
-            <a:r>
-              <a:rPr lang="en-US" sz="2400" dirty="0" smtClean="0">
-                <a:hlinkClick r:id="rId3"/>
-              </a:rPr>
-              <a:t>sourceforge.net/projects/fitlibrary/</a:t>
+              <a:t>http://sourceforge.net/projects/fitlibrary/</a:t>
             </a:r>
             <a:r>
               <a:rPr lang="en-US" sz="2400" dirty="0" smtClean="0"/>
@@ -7619,13 +7537,7 @@
               <a:rPr lang="en-US" sz="2400" dirty="0" smtClean="0">
                 <a:hlinkClick r:id="rId4"/>
               </a:rPr>
-              <a:t>http://gojko.net/fitnesse</a:t>
-            </a:r>
-            <a:r>
-              <a:rPr lang="en-US" sz="2400" dirty="0" smtClean="0">
-                <a:hlinkClick r:id="rId4"/>
-              </a:rPr>
-              <a:t>/</a:t>
+              <a:t>http://gojko.net/fitnesse/</a:t>
             </a:r>
             <a:r>
               <a:rPr lang="en-US" sz="2400" dirty="0" smtClean="0"/>
@@ -7638,13 +7550,7 @@
               <a:rPr lang="nl-BE" sz="2400" dirty="0" smtClean="0">
                 <a:hlinkClick r:id="rId5"/>
               </a:rPr>
-              <a:t>http://</a:t>
-            </a:r>
-            <a:r>
-              <a:rPr lang="nl-BE" sz="2400" dirty="0" smtClean="0">
-                <a:hlinkClick r:id="rId5"/>
-              </a:rPr>
-              <a:t>codebetter.com/blogs/ian_cooper/archive/2008/10/13/fitnesse-and-the-three-way.aspx</a:t>
+              <a:t>http://codebetter.com/blogs/ian_cooper/archive/2008/10/13/fitnesse-and-the-three-way.aspx</a:t>
             </a:r>
             <a:r>
               <a:rPr lang="nl-BE" sz="2400" dirty="0" smtClean="0"/>
@@ -7666,13 +7572,7 @@
               <a:rPr lang="en-US" sz="2400" dirty="0" smtClean="0">
                 <a:hlinkClick r:id="rId6"/>
               </a:rPr>
-              <a:t>http://tech.groups.yahoo.com/group/fitnesse</a:t>
-            </a:r>
-            <a:r>
-              <a:rPr lang="en-US" sz="2400" dirty="0" smtClean="0">
-                <a:hlinkClick r:id="rId6"/>
-              </a:rPr>
-              <a:t>/</a:t>
+              <a:t>http://tech.groups.yahoo.com/group/fitnesse/</a:t>
             </a:r>
             <a:r>
               <a:rPr lang="en-US" sz="2400" dirty="0" smtClean="0"/>
@@ -7956,7 +7856,6 @@
               <a:rPr lang="nl-BE" i="1" dirty="0" smtClean="0"/>
               <a:t>Continuous Integration</a:t>
             </a:r>
-            <a:endParaRPr lang="nl-BE" i="1" dirty="0" smtClean="0"/>
           </a:p>
           <a:p>
             <a:pPr marL="624078" indent="-514350"/>
@@ -9121,7 +9020,19 @@
           <a:p>
             <a:r>
               <a:rPr lang="nl-BE" dirty="0" smtClean="0"/>
-              <a:t>Lets turn those examples into executable specifications to verify that be have build the wright code.</a:t>
+              <a:t>Lets turn those examples into executable specifications to verify </a:t>
+            </a:r>
+            <a:r>
+              <a:rPr lang="nl-BE" smtClean="0"/>
+              <a:t>that </a:t>
+            </a:r>
+            <a:r>
+              <a:rPr lang="nl-BE" smtClean="0"/>
+              <a:t>we </a:t>
+            </a:r>
+            <a:r>
+              <a:rPr lang="nl-BE" dirty="0" smtClean="0"/>
+              <a:t>have build the wright code.</a:t>
             </a:r>
           </a:p>
           <a:p>

</xml_diff>